<commit_message>
update techbash slides and nugets
</commit_message>
<xml_diff>
--- a/2025/1107_TechBash/WindowsAI/TechBash 2025 - Intelligent Windows Apps with WAI.pptx
+++ b/2025/1107_TechBash/WindowsAI/TechBash 2025 - Intelligent Windows Apps with WAI.pptx
@@ -3740,7 +3740,7 @@
           <a:p>
             <a:fld id="{73CB10F5-9066-4A54-B3E5-B7F0DC270549}" type="datetimeFigureOut">
               <a:rPr lang="en-US" smtClean="0"/>
-              <a:t>10/12/2025</a:t>
+              <a:t>10/25/2025</a:t>
             </a:fld>
             <a:endParaRPr lang="en-US"/>
           </a:p>
@@ -4053,7 +4053,7 @@
           <a:p>
             <a:r>
               <a:rPr lang="en-US" dirty="0"/>
-              <a:t>Welcome to TechBash 2025 and my session on the new (and still mostly experimental) Windows AI APIs in the Windows App SDK.</a:t>
+              <a:t>Welcome to TechBash 2025 and my session on the new Windows AI APIs in the Windows App SDK.</a:t>
             </a:r>
           </a:p>
         </p:txBody>
@@ -4400,7 +4400,7 @@
             </a:r>
             <a:r>
               <a:rPr lang="en-US" dirty="0"/>
-              <a:t> Publishing. You can check those out on </a:t>
+              <a:t> Publishing with a fourth on the way. You can check those out on </a:t>
             </a:r>
             <a:r>
               <a:rPr lang="en-US" dirty="0" err="1"/>
@@ -4417,7 +4417,7 @@
           <a:p>
             <a:r>
               <a:rPr lang="en-US" dirty="0"/>
-              <a:t>Writing those books led me to pivot my career to technical writing. I joined Microsoft two years ago as a content developer. I write documentation, training modules, and code samples on Microsoft Learn. I work on the Windows developer docs team, helping to maintain the docs for client apps and APIs. I have another talk I give about my work as a content developer and how anyone can contribute to content on Learn through GitHub issues and PRs.</a:t>
+              <a:t>Writing those books led me to pivot my career to technical writing. I joined Microsoft about three and a half years ago as a content developer. I write documentation, training modules, and code samples on Microsoft Learn. I work on the Windows developer docs team, helping to maintain the docs for client apps and APIs. I have another talk I give about my work as a content developer and how anyone can contribute to content on Learn through GitHub issues and PRs.</a:t>
             </a:r>
           </a:p>
           <a:p>
@@ -4426,7 +4426,7 @@
           <a:p>
             <a:r>
               <a:rPr lang="en-US" dirty="0"/>
-              <a:t>Finally, I’m one of the founding organizers of the TechBash developer conference. We’ve been running the event in the Poconos since 2016.</a:t>
+              <a:t>Finally, I’m one of the founding organizers of the TechBash developer conference. We’ve been running the event right here in the Poconos since 2016.</a:t>
             </a:r>
           </a:p>
           <a:p>
@@ -4519,7 +4519,7 @@
           <a:p>
             <a:r>
               <a:rPr lang="en-US" dirty="0"/>
-              <a:t>Here’s what I plan to cover tonight. We’ll go a little deeper in some areas than others, based on how baked each of the features are.</a:t>
+              <a:t>Here’s what I plan to cover today. We’ll go a little deeper in some areas than others, based on how baked each of the features are.</a:t>
             </a:r>
           </a:p>
           <a:p>
@@ -4528,7 +4528,7 @@
           <a:p>
             <a:r>
               <a:rPr lang="en-US" dirty="0"/>
-              <a:t>Things are moving fast, and there are a lot of AI options popping up for .NET developers. And we’re not even talking about AI options for developer productivity, like GitHub Copilot and tools like Cursor and Warp.</a:t>
+              <a:t>Things are moving fast, and the AI landscape for .NET developers is evolving quickly.</a:t>
             </a:r>
           </a:p>
           <a:p>
@@ -4546,25 +4546,47 @@
           <a:p>
             <a:r>
               <a:rPr lang="en-US" dirty="0"/>
-              <a:t>Then we’ll try to untangle somethings that were announced last year at Build and Ignite and were just updated and rebranded at Build this week:</a:t>
-            </a:r>
-          </a:p>
-          <a:p>
+              <a:t>Then we’ll try to untangle somethings that were announced and updated over the last year and a half:</a:t>
+            </a:r>
+          </a:p>
+          <a:p>
+            <a:pPr marL="171450" indent="-171450">
+              <a:buFont typeface="Arial" panose="020B0604020202020204" pitchFamily="34" charset="0"/>
+              <a:buChar char="•"/>
+            </a:pPr>
             <a:r>
               <a:rPr lang="en-US" dirty="0"/>
-              <a:t>Copilot Plus PCs remain basically the same as what was announced and released last year and Phi Silica is the local model on those PCs.</a:t>
-            </a:r>
-          </a:p>
-          <a:p>
+              <a:t>Copilot+ PCs are devices optimized for local AI workloads with an NPU and Phi Silica is the local model on those PCs. The first models had Arm processors, but Intel and AMD have their own NPU-based models across multiple manufacturers now too.</a:t>
+            </a:r>
+          </a:p>
+          <a:p>
+            <a:pPr marL="171450" indent="-171450">
+              <a:buFont typeface="Arial" panose="020B0604020202020204" pitchFamily="34" charset="0"/>
+              <a:buChar char="•"/>
+            </a:pPr>
             <a:r>
               <a:rPr lang="en-US" dirty="0"/>
-              <a:t>Windows Copilot Runtime and some other AI features are now part of Windows AI Foundry.</a:t>
-            </a:r>
-          </a:p>
-          <a:p>
+              <a:t>Windows AI Foundry encompasses the local Windows AI features and hosts local AI models.</a:t>
+            </a:r>
+          </a:p>
+          <a:p>
+            <a:pPr marL="171450" indent="-171450">
+              <a:buFont typeface="Arial" panose="020B0604020202020204" pitchFamily="34" charset="0"/>
+              <a:buChar char="•"/>
+            </a:pPr>
             <a:r>
               <a:rPr lang="en-US" dirty="0"/>
-              <a:t>The Windows Copilot Runtime APIs are now the Windows AI APIs.</a:t>
+              <a:t>The Windows AI APIs are a set of APIs in the Windows App SDK that leverage the local Phi Silica model found on Copilot+ PCs.</a:t>
+            </a:r>
+          </a:p>
+          <a:p>
+            <a:pPr marL="171450" indent="-171450">
+              <a:buFont typeface="Arial" panose="020B0604020202020204" pitchFamily="34" charset="0"/>
+              <a:buChar char="•"/>
+            </a:pPr>
+            <a:r>
+              <a:rPr lang="en-US" dirty="0"/>
+              <a:t>Windows ML is another set of APIs and features in the Windows App SDK for accessing other types of local AI models in Windows AI Foundry. Machines without an NPU can also use these APIs.</a:t>
             </a:r>
           </a:p>
           <a:p>
@@ -5985,7 +6007,7 @@
           <a:p>
             <a:fld id="{9C4DA1B5-7104-436F-9E1E-E978D03B73E0}" type="datetimeFigureOut">
               <a:rPr lang="en-US" smtClean="0"/>
-              <a:t>10/12/2025</a:t>
+              <a:t>10/25/2025</a:t>
             </a:fld>
             <a:endParaRPr lang="en-US"/>
           </a:p>
@@ -6260,7 +6282,7 @@
           <a:p>
             <a:fld id="{9C4DA1B5-7104-436F-9E1E-E978D03B73E0}" type="datetimeFigureOut">
               <a:rPr lang="en-US" smtClean="0"/>
-              <a:t>10/12/2025</a:t>
+              <a:t>10/25/2025</a:t>
             </a:fld>
             <a:endParaRPr lang="en-US"/>
           </a:p>
@@ -6454,7 +6476,7 @@
           <a:p>
             <a:fld id="{9C4DA1B5-7104-436F-9E1E-E978D03B73E0}" type="datetimeFigureOut">
               <a:rPr lang="en-US" smtClean="0"/>
-              <a:t>10/12/2025</a:t>
+              <a:t>10/25/2025</a:t>
             </a:fld>
             <a:endParaRPr lang="en-US"/>
           </a:p>
@@ -6722,7 +6744,7 @@
           <a:p>
             <a:fld id="{9C4DA1B5-7104-436F-9E1E-E978D03B73E0}" type="datetimeFigureOut">
               <a:rPr lang="en-US" smtClean="0"/>
-              <a:t>10/12/2025</a:t>
+              <a:t>10/25/2025</a:t>
             </a:fld>
             <a:endParaRPr lang="en-US"/>
           </a:p>
@@ -7054,7 +7076,7 @@
           <a:p>
             <a:fld id="{9C4DA1B5-7104-436F-9E1E-E978D03B73E0}" type="datetimeFigureOut">
               <a:rPr lang="en-US" smtClean="0"/>
-              <a:t>10/12/2025</a:t>
+              <a:t>10/25/2025</a:t>
             </a:fld>
             <a:endParaRPr lang="en-US"/>
           </a:p>
@@ -7664,7 +7686,7 @@
           <a:p>
             <a:fld id="{9C4DA1B5-7104-436F-9E1E-E978D03B73E0}" type="datetimeFigureOut">
               <a:rPr lang="en-US" smtClean="0"/>
-              <a:t>10/12/2025</a:t>
+              <a:t>10/25/2025</a:t>
             </a:fld>
             <a:endParaRPr lang="en-US"/>
           </a:p>
@@ -8511,7 +8533,7 @@
           <a:p>
             <a:fld id="{9C4DA1B5-7104-436F-9E1E-E978D03B73E0}" type="datetimeFigureOut">
               <a:rPr lang="en-US" smtClean="0"/>
-              <a:t>10/12/2025</a:t>
+              <a:t>10/25/2025</a:t>
             </a:fld>
             <a:endParaRPr lang="en-US"/>
           </a:p>
@@ -8681,7 +8703,7 @@
           <a:p>
             <a:fld id="{9C4DA1B5-7104-436F-9E1E-E978D03B73E0}" type="datetimeFigureOut">
               <a:rPr lang="en-US" smtClean="0"/>
-              <a:t>10/12/2025</a:t>
+              <a:t>10/25/2025</a:t>
             </a:fld>
             <a:endParaRPr lang="en-US"/>
           </a:p>
@@ -8861,7 +8883,7 @@
           <a:p>
             <a:fld id="{9C4DA1B5-7104-436F-9E1E-E978D03B73E0}" type="datetimeFigureOut">
               <a:rPr lang="en-US" smtClean="0"/>
-              <a:t>10/12/2025</a:t>
+              <a:t>10/25/2025</a:t>
             </a:fld>
             <a:endParaRPr lang="en-US"/>
           </a:p>
@@ -9031,7 +9053,7 @@
           <a:p>
             <a:fld id="{9C4DA1B5-7104-436F-9E1E-E978D03B73E0}" type="datetimeFigureOut">
               <a:rPr lang="en-US" smtClean="0"/>
-              <a:t>10/12/2025</a:t>
+              <a:t>10/25/2025</a:t>
             </a:fld>
             <a:endParaRPr lang="en-US"/>
           </a:p>
@@ -9275,7 +9297,7 @@
           <a:p>
             <a:fld id="{9C4DA1B5-7104-436F-9E1E-E978D03B73E0}" type="datetimeFigureOut">
               <a:rPr lang="en-US" smtClean="0"/>
-              <a:t>10/12/2025</a:t>
+              <a:t>10/25/2025</a:t>
             </a:fld>
             <a:endParaRPr lang="en-US"/>
           </a:p>
@@ -9567,7 +9589,7 @@
           <a:p>
             <a:fld id="{9C4DA1B5-7104-436F-9E1E-E978D03B73E0}" type="datetimeFigureOut">
               <a:rPr lang="en-US" smtClean="0"/>
-              <a:t>10/12/2025</a:t>
+              <a:t>10/25/2025</a:t>
             </a:fld>
             <a:endParaRPr lang="en-US"/>
           </a:p>
@@ -10005,7 +10027,7 @@
           <a:p>
             <a:fld id="{9C4DA1B5-7104-436F-9E1E-E978D03B73E0}" type="datetimeFigureOut">
               <a:rPr lang="en-US" smtClean="0"/>
-              <a:t>10/12/2025</a:t>
+              <a:t>10/25/2025</a:t>
             </a:fld>
             <a:endParaRPr lang="en-US"/>
           </a:p>
@@ -10123,7 +10145,7 @@
           <a:p>
             <a:fld id="{9C4DA1B5-7104-436F-9E1E-E978D03B73E0}" type="datetimeFigureOut">
               <a:rPr lang="en-US" smtClean="0"/>
-              <a:t>10/12/2025</a:t>
+              <a:t>10/25/2025</a:t>
             </a:fld>
             <a:endParaRPr lang="en-US"/>
           </a:p>
@@ -10218,7 +10240,7 @@
           <a:p>
             <a:fld id="{9C4DA1B5-7104-436F-9E1E-E978D03B73E0}" type="datetimeFigureOut">
               <a:rPr lang="en-US" smtClean="0"/>
-              <a:t>10/12/2025</a:t>
+              <a:t>10/25/2025</a:t>
             </a:fld>
             <a:endParaRPr lang="en-US"/>
           </a:p>
@@ -10497,7 +10519,7 @@
           <a:p>
             <a:fld id="{9C4DA1B5-7104-436F-9E1E-E978D03B73E0}" type="datetimeFigureOut">
               <a:rPr lang="en-US" smtClean="0"/>
-              <a:t>10/12/2025</a:t>
+              <a:t>10/25/2025</a:t>
             </a:fld>
             <a:endParaRPr lang="en-US"/>
           </a:p>
@@ -10772,7 +10794,7 @@
           <a:p>
             <a:fld id="{9C4DA1B5-7104-436F-9E1E-E978D03B73E0}" type="datetimeFigureOut">
               <a:rPr lang="en-US" smtClean="0"/>
-              <a:t>10/12/2025</a:t>
+              <a:t>10/25/2025</a:t>
             </a:fld>
             <a:endParaRPr lang="en-US"/>
           </a:p>
@@ -11215,7 +11237,7 @@
           <a:p>
             <a:fld id="{9C4DA1B5-7104-436F-9E1E-E978D03B73E0}" type="datetimeFigureOut">
               <a:rPr lang="en-US" smtClean="0"/>
-              <a:t>10/12/2025</a:t>
+              <a:t>10/25/2025</a:t>
             </a:fld>
             <a:endParaRPr lang="en-US"/>
           </a:p>

</xml_diff>